<commit_message>
Vortrag Gateway und Load Balancer
</commit_message>
<xml_diff>
--- a/Vortrag.pptx
+++ b/Vortrag.pptx
@@ -5,7 +5,7 @@
     <p:sldMasterId id="2147483648" r:id="rId4"/>
   </p:sldMasterIdLst>
   <p:notesMasterIdLst>
-    <p:notesMasterId r:id="rId15"/>
+    <p:notesMasterId r:id="rId18"/>
   </p:notesMasterIdLst>
   <p:sldIdLst>
     <p:sldId id="256" r:id="rId5"/>
@@ -18,6 +18,9 @@
     <p:sldId id="264" r:id="rId12"/>
     <p:sldId id="265" r:id="rId13"/>
     <p:sldId id="266" r:id="rId14"/>
+    <p:sldId id="269" r:id="rId15"/>
+    <p:sldId id="267" r:id="rId16"/>
+    <p:sldId id="268" r:id="rId17"/>
   </p:sldIdLst>
   <p:sldSz cx="12192000" cy="6858000"/>
   <p:notesSz cx="6858000" cy="9144000"/>
@@ -119,7 +122,7 @@
   <p:extLst>
     <p:ext uri="{EFAFB233-063F-42B5-8137-9DF3F51BA10A}">
       <p15:sldGuideLst xmlns:p15="http://schemas.microsoft.com/office/powerpoint/2012/main">
-        <p15:guide id="1" orient="horz" pos="2137" userDrawn="1">
+        <p15:guide id="1" orient="horz" pos="2115" userDrawn="1">
           <p15:clr>
             <a:srgbClr val="A4A3A4"/>
           </p15:clr>
@@ -6958,7 +6961,12 @@
             <p:ph type="title"/>
           </p:nvPr>
         </p:nvSpPr>
-        <p:spPr/>
+        <p:spPr>
+          <a:xfrm>
+            <a:off x="1614650" y="540904"/>
+            <a:ext cx="7958331" cy="1077229"/>
+          </a:xfrm>
+        </p:spPr>
         <p:txBody>
           <a:bodyPr/>
           <a:lstStyle/>
@@ -6967,31 +6975,6 @@
               <a:rPr lang="de-DE" dirty="0"/>
               <a:t>API Gateway - Grundlagen</a:t>
             </a:r>
-          </a:p>
-        </p:txBody>
-      </p:sp>
-      <p:sp>
-        <p:nvSpPr>
-          <p:cNvPr id="3" name="Inhaltsplatzhalter 2">
-            <a:extLst>
-              <a:ext uri="{FF2B5EF4-FFF2-40B4-BE49-F238E27FC236}">
-                <a16:creationId xmlns:a16="http://schemas.microsoft.com/office/drawing/2014/main" id="{DA57C915-9777-4247-9577-61816DCE7D03}"/>
-              </a:ext>
-            </a:extLst>
-          </p:cNvPr>
-          <p:cNvSpPr>
-            <a:spLocks noGrp="1"/>
-          </p:cNvSpPr>
-          <p:nvPr>
-            <p:ph idx="1"/>
-          </p:nvPr>
-        </p:nvSpPr>
-        <p:spPr/>
-        <p:txBody>
-          <a:bodyPr/>
-          <a:lstStyle/>
-          <a:p>
-            <a:endParaRPr lang="de-DE" dirty="0"/>
           </a:p>
         </p:txBody>
       </p:sp>
@@ -7083,10 +7066,1413 @@
           </a:p>
         </p:txBody>
       </p:sp>
+      <p:pic>
+        <p:nvPicPr>
+          <p:cNvPr id="7" name="Inhaltsplatzhalter 6">
+            <a:extLst>
+              <a:ext uri="{FF2B5EF4-FFF2-40B4-BE49-F238E27FC236}">
+                <a16:creationId xmlns:a16="http://schemas.microsoft.com/office/drawing/2014/main" id="{BDCFDA08-E078-4958-A7C6-3DD31EC5D3BB}"/>
+              </a:ext>
+            </a:extLst>
+          </p:cNvPr>
+          <p:cNvPicPr>
+            <a:picLocks noGrp="1" noChangeAspect="1"/>
+          </p:cNvPicPr>
+          <p:nvPr>
+            <p:ph idx="1"/>
+          </p:nvPr>
+        </p:nvPicPr>
+        <p:blipFill>
+          <a:blip r:embed="rId2">
+            <a:extLst>
+              <a:ext uri="{28A0092B-C50C-407E-A947-70E740481C1C}">
+                <a14:useLocalDpi xmlns:a14="http://schemas.microsoft.com/office/drawing/2010/main" val="0"/>
+              </a:ext>
+            </a:extLst>
+          </a:blip>
+          <a:srcRect/>
+          <a:stretch>
+            <a:fillRect/>
+          </a:stretch>
+        </p:blipFill>
+        <p:spPr bwMode="auto">
+          <a:xfrm>
+            <a:off x="6805984" y="1618133"/>
+            <a:ext cx="4268726" cy="1886181"/>
+          </a:xfrm>
+          <a:prstGeom prst="rect">
+            <a:avLst/>
+          </a:prstGeom>
+          <a:noFill/>
+          <a:ln>
+            <a:noFill/>
+          </a:ln>
+        </p:spPr>
+      </p:pic>
+      <p:pic>
+        <p:nvPicPr>
+          <p:cNvPr id="8" name="Grafik 7">
+            <a:extLst>
+              <a:ext uri="{FF2B5EF4-FFF2-40B4-BE49-F238E27FC236}">
+                <a16:creationId xmlns:a16="http://schemas.microsoft.com/office/drawing/2014/main" id="{E41F7E24-B02A-49DE-9FCE-694951ED5972}"/>
+              </a:ext>
+            </a:extLst>
+          </p:cNvPr>
+          <p:cNvPicPr>
+            <a:picLocks noChangeAspect="1"/>
+          </p:cNvPicPr>
+          <p:nvPr/>
+        </p:nvPicPr>
+        <p:blipFill>
+          <a:blip r:embed="rId3">
+            <a:extLst>
+              <a:ext uri="{28A0092B-C50C-407E-A947-70E740481C1C}">
+                <a14:useLocalDpi xmlns:a14="http://schemas.microsoft.com/office/drawing/2010/main" val="0"/>
+              </a:ext>
+            </a:extLst>
+          </a:blip>
+          <a:srcRect/>
+          <a:stretch>
+            <a:fillRect/>
+          </a:stretch>
+        </p:blipFill>
+        <p:spPr bwMode="auto">
+          <a:xfrm>
+            <a:off x="6805984" y="3942198"/>
+            <a:ext cx="4143950" cy="2462771"/>
+          </a:xfrm>
+          <a:prstGeom prst="rect">
+            <a:avLst/>
+          </a:prstGeom>
+          <a:noFill/>
+          <a:ln>
+            <a:noFill/>
+          </a:ln>
+        </p:spPr>
+      </p:pic>
+      <p:sp>
+        <p:nvSpPr>
+          <p:cNvPr id="11" name="Inhaltsplatzhalter 2">
+            <a:extLst>
+              <a:ext uri="{FF2B5EF4-FFF2-40B4-BE49-F238E27FC236}">
+                <a16:creationId xmlns:a16="http://schemas.microsoft.com/office/drawing/2014/main" id="{540C570D-65B6-4267-BEB2-EDB36260197E}"/>
+              </a:ext>
+            </a:extLst>
+          </p:cNvPr>
+          <p:cNvSpPr txBox="1">
+            <a:spLocks/>
+          </p:cNvSpPr>
+          <p:nvPr/>
+        </p:nvSpPr>
+        <p:spPr>
+          <a:xfrm>
+            <a:off x="1614650" y="1311072"/>
+            <a:ext cx="4391378" cy="2220087"/>
+          </a:xfrm>
+          <a:prstGeom prst="rect">
+            <a:avLst/>
+          </a:prstGeom>
+        </p:spPr>
+        <p:txBody>
+          <a:bodyPr vert="horz" lIns="91440" tIns="45720" rIns="91440" bIns="45720" rtlCol="0" anchor="ctr">
+            <a:noAutofit/>
+          </a:bodyPr>
+          <a:lstStyle>
+            <a:lvl1pPr marL="344488" indent="-344488" algn="l" defTabSz="914400" rtl="0" eaLnBrk="1" latinLnBrk="0" hangingPunct="1">
+              <a:lnSpc>
+                <a:spcPct val="120000"/>
+              </a:lnSpc>
+              <a:spcBef>
+                <a:spcPts val="1000"/>
+              </a:spcBef>
+              <a:spcAft>
+                <a:spcPts val="600"/>
+              </a:spcAft>
+              <a:buClr>
+                <a:schemeClr val="accent6"/>
+              </a:buClr>
+              <a:buSzPct val="90000"/>
+              <a:buFont typeface="Wingdings" panose="05000000000000000000" pitchFamily="2" charset="2"/>
+              <a:buChar char="§"/>
+              <a:defRPr sz="2000" kern="1200">
+                <a:solidFill>
+                  <a:schemeClr val="tx1"/>
+                </a:solidFill>
+                <a:effectLst/>
+                <a:latin typeface="+mn-lt"/>
+                <a:ea typeface="+mn-ea"/>
+                <a:cs typeface="+mn-cs"/>
+              </a:defRPr>
+            </a:lvl1pPr>
+            <a:lvl2pPr marL="795338" indent="-338138" algn="l" defTabSz="914400" rtl="0" eaLnBrk="1" latinLnBrk="0" hangingPunct="1">
+              <a:lnSpc>
+                <a:spcPct val="120000"/>
+              </a:lnSpc>
+              <a:spcBef>
+                <a:spcPts val="500"/>
+              </a:spcBef>
+              <a:spcAft>
+                <a:spcPts val="600"/>
+              </a:spcAft>
+              <a:buClr>
+                <a:schemeClr val="accent6"/>
+              </a:buClr>
+              <a:buSzPct val="90000"/>
+              <a:buFont typeface="Wingdings" panose="05000000000000000000" pitchFamily="2" charset="2"/>
+              <a:buChar char="§"/>
+              <a:defRPr sz="1800" kern="1200">
+                <a:solidFill>
+                  <a:schemeClr val="tx1"/>
+                </a:solidFill>
+                <a:effectLst/>
+                <a:latin typeface="+mn-lt"/>
+                <a:ea typeface="+mn-ea"/>
+                <a:cs typeface="+mn-cs"/>
+              </a:defRPr>
+            </a:lvl2pPr>
+            <a:lvl3pPr marL="1258888" indent="-344488" algn="l" defTabSz="914400" rtl="0" eaLnBrk="1" latinLnBrk="0" hangingPunct="1">
+              <a:lnSpc>
+                <a:spcPct val="120000"/>
+              </a:lnSpc>
+              <a:spcBef>
+                <a:spcPts val="500"/>
+              </a:spcBef>
+              <a:spcAft>
+                <a:spcPts val="600"/>
+              </a:spcAft>
+              <a:buClr>
+                <a:schemeClr val="accent6"/>
+              </a:buClr>
+              <a:buSzPct val="90000"/>
+              <a:buFont typeface="Wingdings" panose="05000000000000000000" pitchFamily="2" charset="2"/>
+              <a:buChar char="§"/>
+              <a:defRPr sz="1600" kern="1200">
+                <a:solidFill>
+                  <a:schemeClr val="tx1"/>
+                </a:solidFill>
+                <a:effectLst/>
+                <a:latin typeface="+mn-lt"/>
+                <a:ea typeface="+mn-ea"/>
+                <a:cs typeface="+mn-cs"/>
+              </a:defRPr>
+            </a:lvl3pPr>
+            <a:lvl4pPr marL="1709738" indent="-338138" algn="l" defTabSz="914400" rtl="0" eaLnBrk="1" latinLnBrk="0" hangingPunct="1">
+              <a:lnSpc>
+                <a:spcPct val="120000"/>
+              </a:lnSpc>
+              <a:spcBef>
+                <a:spcPts val="500"/>
+              </a:spcBef>
+              <a:spcAft>
+                <a:spcPts val="600"/>
+              </a:spcAft>
+              <a:buClr>
+                <a:schemeClr val="accent6"/>
+              </a:buClr>
+              <a:buSzPct val="90000"/>
+              <a:buFont typeface="Wingdings" panose="05000000000000000000" pitchFamily="2" charset="2"/>
+              <a:buChar char="§"/>
+              <a:defRPr sz="1400" kern="1200">
+                <a:solidFill>
+                  <a:schemeClr val="tx1"/>
+                </a:solidFill>
+                <a:effectLst/>
+                <a:latin typeface="+mn-lt"/>
+                <a:ea typeface="+mn-ea"/>
+                <a:cs typeface="+mn-cs"/>
+              </a:defRPr>
+            </a:lvl4pPr>
+            <a:lvl5pPr marL="2173288" indent="-344488" algn="l" defTabSz="914400" rtl="0" eaLnBrk="1" latinLnBrk="0" hangingPunct="1">
+              <a:lnSpc>
+                <a:spcPct val="120000"/>
+              </a:lnSpc>
+              <a:spcBef>
+                <a:spcPts val="500"/>
+              </a:spcBef>
+              <a:spcAft>
+                <a:spcPts val="600"/>
+              </a:spcAft>
+              <a:buClr>
+                <a:schemeClr val="accent6"/>
+              </a:buClr>
+              <a:buSzPct val="90000"/>
+              <a:buFont typeface="Wingdings" panose="05000000000000000000" pitchFamily="2" charset="2"/>
+              <a:buChar char="§"/>
+              <a:defRPr sz="1200" kern="1200">
+                <a:solidFill>
+                  <a:schemeClr val="tx1"/>
+                </a:solidFill>
+                <a:effectLst/>
+                <a:latin typeface="+mn-lt"/>
+                <a:ea typeface="+mn-ea"/>
+                <a:cs typeface="+mn-cs"/>
+              </a:defRPr>
+            </a:lvl5pPr>
+            <a:lvl6pPr marL="2642616" indent="-338328" algn="l" defTabSz="914400" rtl="0" eaLnBrk="1" latinLnBrk="0" hangingPunct="1">
+              <a:lnSpc>
+                <a:spcPct val="120000"/>
+              </a:lnSpc>
+              <a:spcBef>
+                <a:spcPts val="500"/>
+              </a:spcBef>
+              <a:spcAft>
+                <a:spcPts val="600"/>
+              </a:spcAft>
+              <a:buClr>
+                <a:schemeClr val="accent6"/>
+              </a:buClr>
+              <a:buSzPct val="90000"/>
+              <a:buFont typeface="Wingdings" panose="05000000000000000000" pitchFamily="2" charset="2"/>
+              <a:buChar char="§"/>
+              <a:defRPr sz="1200" kern="1200" baseline="0">
+                <a:solidFill>
+                  <a:schemeClr val="tx1"/>
+                </a:solidFill>
+                <a:effectLst/>
+                <a:latin typeface="+mn-lt"/>
+                <a:ea typeface="+mn-ea"/>
+                <a:cs typeface="+mn-cs"/>
+              </a:defRPr>
+            </a:lvl6pPr>
+            <a:lvl7pPr marL="3108960" indent="-338328" algn="l" defTabSz="914400" rtl="0" eaLnBrk="1" latinLnBrk="0" hangingPunct="1">
+              <a:lnSpc>
+                <a:spcPct val="120000"/>
+              </a:lnSpc>
+              <a:spcBef>
+                <a:spcPts val="500"/>
+              </a:spcBef>
+              <a:spcAft>
+                <a:spcPts val="600"/>
+              </a:spcAft>
+              <a:buClr>
+                <a:schemeClr val="accent6"/>
+              </a:buClr>
+              <a:buSzPct val="90000"/>
+              <a:buFont typeface="Wingdings" panose="05000000000000000000" pitchFamily="2" charset="2"/>
+              <a:buChar char="§"/>
+              <a:defRPr sz="1200" kern="1200" baseline="0">
+                <a:solidFill>
+                  <a:schemeClr val="tx1"/>
+                </a:solidFill>
+                <a:effectLst/>
+                <a:latin typeface="+mn-lt"/>
+                <a:ea typeface="+mn-ea"/>
+                <a:cs typeface="+mn-cs"/>
+              </a:defRPr>
+            </a:lvl7pPr>
+            <a:lvl8pPr marL="3575304" indent="-338328" algn="l" defTabSz="914400" rtl="0" eaLnBrk="1" latinLnBrk="0" hangingPunct="1">
+              <a:lnSpc>
+                <a:spcPct val="120000"/>
+              </a:lnSpc>
+              <a:spcBef>
+                <a:spcPts val="500"/>
+              </a:spcBef>
+              <a:spcAft>
+                <a:spcPts val="600"/>
+              </a:spcAft>
+              <a:buClr>
+                <a:schemeClr val="accent6"/>
+              </a:buClr>
+              <a:buSzPct val="90000"/>
+              <a:buFont typeface="Wingdings" panose="05000000000000000000" pitchFamily="2" charset="2"/>
+              <a:buChar char="§"/>
+              <a:defRPr sz="1200" kern="1200" baseline="0">
+                <a:solidFill>
+                  <a:schemeClr val="tx1"/>
+                </a:solidFill>
+                <a:effectLst/>
+                <a:latin typeface="+mn-lt"/>
+                <a:ea typeface="+mn-ea"/>
+                <a:cs typeface="+mn-cs"/>
+              </a:defRPr>
+            </a:lvl8pPr>
+            <a:lvl9pPr marL="4041648" indent="-338328" algn="l" defTabSz="914400" rtl="0" eaLnBrk="1" latinLnBrk="0" hangingPunct="1">
+              <a:lnSpc>
+                <a:spcPct val="120000"/>
+              </a:lnSpc>
+              <a:spcBef>
+                <a:spcPts val="500"/>
+              </a:spcBef>
+              <a:spcAft>
+                <a:spcPts val="600"/>
+              </a:spcAft>
+              <a:buClr>
+                <a:schemeClr val="accent6"/>
+              </a:buClr>
+              <a:buSzPct val="90000"/>
+              <a:buFont typeface="Wingdings" panose="05000000000000000000" pitchFamily="2" charset="2"/>
+              <a:buChar char="§"/>
+              <a:defRPr sz="1200" kern="1200" baseline="0">
+                <a:solidFill>
+                  <a:schemeClr val="tx1"/>
+                </a:solidFill>
+                <a:effectLst/>
+                <a:latin typeface="+mn-lt"/>
+                <a:ea typeface="+mn-ea"/>
+                <a:cs typeface="+mn-cs"/>
+              </a:defRPr>
+            </a:lvl9pPr>
+          </a:lstStyle>
+          <a:p>
+            <a:r>
+              <a:rPr lang="de-DE" sz="1700" dirty="0"/>
+              <a:t>Direkte Kommunikation (Client - Services)</a:t>
+            </a:r>
+          </a:p>
+          <a:p>
+            <a:pPr lvl="1"/>
+            <a:r>
+              <a:rPr lang="de-DE" sz="1500" dirty="0"/>
+              <a:t>Sicherheitsprobleme</a:t>
+            </a:r>
+          </a:p>
+          <a:p>
+            <a:pPr lvl="1"/>
+            <a:r>
+              <a:rPr lang="de-DE" sz="1500" dirty="0"/>
+              <a:t>Enge Kopplung</a:t>
+            </a:r>
+          </a:p>
+        </p:txBody>
+      </p:sp>
+      <p:sp>
+        <p:nvSpPr>
+          <p:cNvPr id="12" name="Inhaltsplatzhalter 2">
+            <a:extLst>
+              <a:ext uri="{FF2B5EF4-FFF2-40B4-BE49-F238E27FC236}">
+                <a16:creationId xmlns:a16="http://schemas.microsoft.com/office/drawing/2014/main" id="{9F66D196-0247-4AB4-A6B5-680C853FACDD}"/>
+              </a:ext>
+            </a:extLst>
+          </p:cNvPr>
+          <p:cNvSpPr txBox="1">
+            <a:spLocks/>
+          </p:cNvSpPr>
+          <p:nvPr/>
+        </p:nvSpPr>
+        <p:spPr>
+          <a:xfrm>
+            <a:off x="1614650" y="3787856"/>
+            <a:ext cx="4481350" cy="3022112"/>
+          </a:xfrm>
+          <a:prstGeom prst="rect">
+            <a:avLst/>
+          </a:prstGeom>
+        </p:spPr>
+        <p:txBody>
+          <a:bodyPr vert="horz" lIns="91440" tIns="45720" rIns="91440" bIns="45720" rtlCol="0" anchor="ctr">
+            <a:normAutofit fontScale="92500" lnSpcReduction="10000"/>
+          </a:bodyPr>
+          <a:lstStyle>
+            <a:lvl1pPr marL="344488" indent="-344488" algn="l" defTabSz="914400" rtl="0" eaLnBrk="1" latinLnBrk="0" hangingPunct="1">
+              <a:lnSpc>
+                <a:spcPct val="120000"/>
+              </a:lnSpc>
+              <a:spcBef>
+                <a:spcPts val="1000"/>
+              </a:spcBef>
+              <a:spcAft>
+                <a:spcPts val="600"/>
+              </a:spcAft>
+              <a:buClr>
+                <a:schemeClr val="accent6"/>
+              </a:buClr>
+              <a:buSzPct val="90000"/>
+              <a:buFont typeface="Wingdings" panose="05000000000000000000" pitchFamily="2" charset="2"/>
+              <a:buChar char="§"/>
+              <a:defRPr sz="2000" kern="1200">
+                <a:solidFill>
+                  <a:schemeClr val="tx1"/>
+                </a:solidFill>
+                <a:effectLst/>
+                <a:latin typeface="+mn-lt"/>
+                <a:ea typeface="+mn-ea"/>
+                <a:cs typeface="+mn-cs"/>
+              </a:defRPr>
+            </a:lvl1pPr>
+            <a:lvl2pPr marL="795338" indent="-338138" algn="l" defTabSz="914400" rtl="0" eaLnBrk="1" latinLnBrk="0" hangingPunct="1">
+              <a:lnSpc>
+                <a:spcPct val="120000"/>
+              </a:lnSpc>
+              <a:spcBef>
+                <a:spcPts val="500"/>
+              </a:spcBef>
+              <a:spcAft>
+                <a:spcPts val="600"/>
+              </a:spcAft>
+              <a:buClr>
+                <a:schemeClr val="accent6"/>
+              </a:buClr>
+              <a:buSzPct val="90000"/>
+              <a:buFont typeface="Wingdings" panose="05000000000000000000" pitchFamily="2" charset="2"/>
+              <a:buChar char="§"/>
+              <a:defRPr sz="1800" kern="1200">
+                <a:solidFill>
+                  <a:schemeClr val="tx1"/>
+                </a:solidFill>
+                <a:effectLst/>
+                <a:latin typeface="+mn-lt"/>
+                <a:ea typeface="+mn-ea"/>
+                <a:cs typeface="+mn-cs"/>
+              </a:defRPr>
+            </a:lvl2pPr>
+            <a:lvl3pPr marL="1258888" indent="-344488" algn="l" defTabSz="914400" rtl="0" eaLnBrk="1" latinLnBrk="0" hangingPunct="1">
+              <a:lnSpc>
+                <a:spcPct val="120000"/>
+              </a:lnSpc>
+              <a:spcBef>
+                <a:spcPts val="500"/>
+              </a:spcBef>
+              <a:spcAft>
+                <a:spcPts val="600"/>
+              </a:spcAft>
+              <a:buClr>
+                <a:schemeClr val="accent6"/>
+              </a:buClr>
+              <a:buSzPct val="90000"/>
+              <a:buFont typeface="Wingdings" panose="05000000000000000000" pitchFamily="2" charset="2"/>
+              <a:buChar char="§"/>
+              <a:defRPr sz="1600" kern="1200">
+                <a:solidFill>
+                  <a:schemeClr val="tx1"/>
+                </a:solidFill>
+                <a:effectLst/>
+                <a:latin typeface="+mn-lt"/>
+                <a:ea typeface="+mn-ea"/>
+                <a:cs typeface="+mn-cs"/>
+              </a:defRPr>
+            </a:lvl3pPr>
+            <a:lvl4pPr marL="1709738" indent="-338138" algn="l" defTabSz="914400" rtl="0" eaLnBrk="1" latinLnBrk="0" hangingPunct="1">
+              <a:lnSpc>
+                <a:spcPct val="120000"/>
+              </a:lnSpc>
+              <a:spcBef>
+                <a:spcPts val="500"/>
+              </a:spcBef>
+              <a:spcAft>
+                <a:spcPts val="600"/>
+              </a:spcAft>
+              <a:buClr>
+                <a:schemeClr val="accent6"/>
+              </a:buClr>
+              <a:buSzPct val="90000"/>
+              <a:buFont typeface="Wingdings" panose="05000000000000000000" pitchFamily="2" charset="2"/>
+              <a:buChar char="§"/>
+              <a:defRPr sz="1400" kern="1200">
+                <a:solidFill>
+                  <a:schemeClr val="tx1"/>
+                </a:solidFill>
+                <a:effectLst/>
+                <a:latin typeface="+mn-lt"/>
+                <a:ea typeface="+mn-ea"/>
+                <a:cs typeface="+mn-cs"/>
+              </a:defRPr>
+            </a:lvl4pPr>
+            <a:lvl5pPr marL="2173288" indent="-344488" algn="l" defTabSz="914400" rtl="0" eaLnBrk="1" latinLnBrk="0" hangingPunct="1">
+              <a:lnSpc>
+                <a:spcPct val="120000"/>
+              </a:lnSpc>
+              <a:spcBef>
+                <a:spcPts val="500"/>
+              </a:spcBef>
+              <a:spcAft>
+                <a:spcPts val="600"/>
+              </a:spcAft>
+              <a:buClr>
+                <a:schemeClr val="accent6"/>
+              </a:buClr>
+              <a:buSzPct val="90000"/>
+              <a:buFont typeface="Wingdings" panose="05000000000000000000" pitchFamily="2" charset="2"/>
+              <a:buChar char="§"/>
+              <a:defRPr sz="1200" kern="1200">
+                <a:solidFill>
+                  <a:schemeClr val="tx1"/>
+                </a:solidFill>
+                <a:effectLst/>
+                <a:latin typeface="+mn-lt"/>
+                <a:ea typeface="+mn-ea"/>
+                <a:cs typeface="+mn-cs"/>
+              </a:defRPr>
+            </a:lvl5pPr>
+            <a:lvl6pPr marL="2642616" indent="-338328" algn="l" defTabSz="914400" rtl="0" eaLnBrk="1" latinLnBrk="0" hangingPunct="1">
+              <a:lnSpc>
+                <a:spcPct val="120000"/>
+              </a:lnSpc>
+              <a:spcBef>
+                <a:spcPts val="500"/>
+              </a:spcBef>
+              <a:spcAft>
+                <a:spcPts val="600"/>
+              </a:spcAft>
+              <a:buClr>
+                <a:schemeClr val="accent6"/>
+              </a:buClr>
+              <a:buSzPct val="90000"/>
+              <a:buFont typeface="Wingdings" panose="05000000000000000000" pitchFamily="2" charset="2"/>
+              <a:buChar char="§"/>
+              <a:defRPr sz="1200" kern="1200" baseline="0">
+                <a:solidFill>
+                  <a:schemeClr val="tx1"/>
+                </a:solidFill>
+                <a:effectLst/>
+                <a:latin typeface="+mn-lt"/>
+                <a:ea typeface="+mn-ea"/>
+                <a:cs typeface="+mn-cs"/>
+              </a:defRPr>
+            </a:lvl6pPr>
+            <a:lvl7pPr marL="3108960" indent="-338328" algn="l" defTabSz="914400" rtl="0" eaLnBrk="1" latinLnBrk="0" hangingPunct="1">
+              <a:lnSpc>
+                <a:spcPct val="120000"/>
+              </a:lnSpc>
+              <a:spcBef>
+                <a:spcPts val="500"/>
+              </a:spcBef>
+              <a:spcAft>
+                <a:spcPts val="600"/>
+              </a:spcAft>
+              <a:buClr>
+                <a:schemeClr val="accent6"/>
+              </a:buClr>
+              <a:buSzPct val="90000"/>
+              <a:buFont typeface="Wingdings" panose="05000000000000000000" pitchFamily="2" charset="2"/>
+              <a:buChar char="§"/>
+              <a:defRPr sz="1200" kern="1200" baseline="0">
+                <a:solidFill>
+                  <a:schemeClr val="tx1"/>
+                </a:solidFill>
+                <a:effectLst/>
+                <a:latin typeface="+mn-lt"/>
+                <a:ea typeface="+mn-ea"/>
+                <a:cs typeface="+mn-cs"/>
+              </a:defRPr>
+            </a:lvl7pPr>
+            <a:lvl8pPr marL="3575304" indent="-338328" algn="l" defTabSz="914400" rtl="0" eaLnBrk="1" latinLnBrk="0" hangingPunct="1">
+              <a:lnSpc>
+                <a:spcPct val="120000"/>
+              </a:lnSpc>
+              <a:spcBef>
+                <a:spcPts val="500"/>
+              </a:spcBef>
+              <a:spcAft>
+                <a:spcPts val="600"/>
+              </a:spcAft>
+              <a:buClr>
+                <a:schemeClr val="accent6"/>
+              </a:buClr>
+              <a:buSzPct val="90000"/>
+              <a:buFont typeface="Wingdings" panose="05000000000000000000" pitchFamily="2" charset="2"/>
+              <a:buChar char="§"/>
+              <a:defRPr sz="1200" kern="1200" baseline="0">
+                <a:solidFill>
+                  <a:schemeClr val="tx1"/>
+                </a:solidFill>
+                <a:effectLst/>
+                <a:latin typeface="+mn-lt"/>
+                <a:ea typeface="+mn-ea"/>
+                <a:cs typeface="+mn-cs"/>
+              </a:defRPr>
+            </a:lvl8pPr>
+            <a:lvl9pPr marL="4041648" indent="-338328" algn="l" defTabSz="914400" rtl="0" eaLnBrk="1" latinLnBrk="0" hangingPunct="1">
+              <a:lnSpc>
+                <a:spcPct val="120000"/>
+              </a:lnSpc>
+              <a:spcBef>
+                <a:spcPts val="500"/>
+              </a:spcBef>
+              <a:spcAft>
+                <a:spcPts val="600"/>
+              </a:spcAft>
+              <a:buClr>
+                <a:schemeClr val="accent6"/>
+              </a:buClr>
+              <a:buSzPct val="90000"/>
+              <a:buFont typeface="Wingdings" panose="05000000000000000000" pitchFamily="2" charset="2"/>
+              <a:buChar char="§"/>
+              <a:defRPr sz="1200" kern="1200" baseline="0">
+                <a:solidFill>
+                  <a:schemeClr val="tx1"/>
+                </a:solidFill>
+                <a:effectLst/>
+                <a:latin typeface="+mn-lt"/>
+                <a:ea typeface="+mn-ea"/>
+                <a:cs typeface="+mn-cs"/>
+              </a:defRPr>
+            </a:lvl9pPr>
+          </a:lstStyle>
+          <a:p>
+            <a:endParaRPr lang="de-DE" sz="1800" dirty="0"/>
+          </a:p>
+          <a:p>
+            <a:r>
+              <a:rPr lang="de-DE" sz="1800" dirty="0"/>
+              <a:t>Kommunikation über Gateway</a:t>
+            </a:r>
+          </a:p>
+          <a:p>
+            <a:pPr lvl="1"/>
+            <a:r>
+              <a:rPr lang="de-DE" sz="1600" dirty="0"/>
+              <a:t>Kontaktpunkt für Ein/-Ausgehenden Netzverkehr</a:t>
+            </a:r>
+          </a:p>
+          <a:p>
+            <a:pPr lvl="1"/>
+            <a:r>
+              <a:rPr lang="de-DE" sz="1600" dirty="0"/>
+              <a:t>Autorisierung &amp; Authentifizierung</a:t>
+            </a:r>
+          </a:p>
+          <a:p>
+            <a:pPr lvl="1"/>
+            <a:r>
+              <a:rPr lang="de-DE" sz="1600" dirty="0"/>
+              <a:t>Zentrales </a:t>
+            </a:r>
+            <a:r>
+              <a:rPr lang="de-DE" sz="1600" dirty="0" err="1"/>
+              <a:t>Logging</a:t>
+            </a:r>
+            <a:r>
+              <a:rPr lang="de-DE" sz="1600" dirty="0"/>
+              <a:t> </a:t>
+            </a:r>
+          </a:p>
+          <a:p>
+            <a:pPr lvl="1"/>
+            <a:r>
+              <a:rPr lang="de-DE" sz="1600" dirty="0"/>
+              <a:t>Nachteil: Ausfall des Gateways zieht den Ausfall des gesamten Systems nach sich</a:t>
+            </a:r>
+          </a:p>
+          <a:p>
+            <a:pPr lvl="1"/>
+            <a:endParaRPr lang="de-DE" dirty="0"/>
+          </a:p>
+          <a:p>
+            <a:endParaRPr lang="de-DE" dirty="0"/>
+          </a:p>
+        </p:txBody>
+      </p:sp>
+      <p:pic>
+        <p:nvPicPr>
+          <p:cNvPr id="14" name="Grafik 13" descr="Schließen mit einfarbiger Füllung">
+            <a:extLst>
+              <a:ext uri="{FF2B5EF4-FFF2-40B4-BE49-F238E27FC236}">
+                <a16:creationId xmlns:a16="http://schemas.microsoft.com/office/drawing/2014/main" id="{DDB06532-B1A1-406D-BD5F-385D63C2756C}"/>
+              </a:ext>
+            </a:extLst>
+          </p:cNvPr>
+          <p:cNvPicPr>
+            <a:picLocks noChangeAspect="1"/>
+          </p:cNvPicPr>
+          <p:nvPr/>
+        </p:nvPicPr>
+        <p:blipFill>
+          <a:blip r:embed="rId4">
+            <a:extLst>
+              <a:ext uri="{96DAC541-7B7A-43D3-8B79-37D633B846F1}">
+                <asvg:svgBlip xmlns:asvg="http://schemas.microsoft.com/office/drawing/2016/SVG/main" r:embed="rId5"/>
+              </a:ext>
+            </a:extLst>
+          </a:blip>
+          <a:stretch>
+            <a:fillRect/>
+          </a:stretch>
+        </p:blipFill>
+        <p:spPr>
+          <a:xfrm>
+            <a:off x="8483147" y="4716383"/>
+            <a:ext cx="914400" cy="914400"/>
+          </a:xfrm>
+          <a:prstGeom prst="rect">
+            <a:avLst/>
+          </a:prstGeom>
+        </p:spPr>
+      </p:pic>
+      <p:pic>
+        <p:nvPicPr>
+          <p:cNvPr id="16" name="Grafik 15" descr="Ratlos mit einfarbiger Füllung">
+            <a:extLst>
+              <a:ext uri="{FF2B5EF4-FFF2-40B4-BE49-F238E27FC236}">
+                <a16:creationId xmlns:a16="http://schemas.microsoft.com/office/drawing/2014/main" id="{66A149B5-4521-40B8-BB88-BF6EC77AFF75}"/>
+              </a:ext>
+            </a:extLst>
+          </p:cNvPr>
+          <p:cNvPicPr>
+            <a:picLocks noChangeAspect="1"/>
+          </p:cNvPicPr>
+          <p:nvPr/>
+        </p:nvPicPr>
+        <p:blipFill>
+          <a:blip r:embed="rId6">
+            <a:extLst>
+              <a:ext uri="{96DAC541-7B7A-43D3-8B79-37D633B846F1}">
+                <asvg:svgBlip xmlns:asvg="http://schemas.microsoft.com/office/drawing/2016/SVG/main" r:embed="rId7"/>
+              </a:ext>
+            </a:extLst>
+          </a:blip>
+          <a:stretch>
+            <a:fillRect/>
+          </a:stretch>
+        </p:blipFill>
+        <p:spPr>
+          <a:xfrm>
+            <a:off x="8663423" y="2297722"/>
+            <a:ext cx="553847" cy="553847"/>
+          </a:xfrm>
+          <a:prstGeom prst="rect">
+            <a:avLst/>
+          </a:prstGeom>
+        </p:spPr>
+      </p:pic>
     </p:spTree>
     <p:extLst>
       <p:ext uri="{BB962C8B-B14F-4D97-AF65-F5344CB8AC3E}">
         <p14:creationId xmlns:p14="http://schemas.microsoft.com/office/powerpoint/2010/main" val="4132415511"/>
+      </p:ext>
+    </p:extLst>
+  </p:cSld>
+  <p:clrMapOvr>
+    <a:masterClrMapping/>
+  </p:clrMapOvr>
+</p:sld>
+</file>
+
+<file path=ppt/slides/slide11.xml><?xml version="1.0" encoding="utf-8"?>
+<p:sld xmlns:a="http://schemas.openxmlformats.org/drawingml/2006/main" xmlns:r="http://schemas.openxmlformats.org/officeDocument/2006/relationships" xmlns:p="http://schemas.openxmlformats.org/presentationml/2006/main">
+  <p:cSld>
+    <p:spTree>
+      <p:nvGrpSpPr>
+        <p:cNvPr id="1" name=""/>
+        <p:cNvGrpSpPr/>
+        <p:nvPr/>
+      </p:nvGrpSpPr>
+      <p:grpSpPr>
+        <a:xfrm>
+          <a:off x="0" y="0"/>
+          <a:ext cx="0" cy="0"/>
+          <a:chOff x="0" y="0"/>
+          <a:chExt cx="0" cy="0"/>
+        </a:xfrm>
+      </p:grpSpPr>
+      <p:sp>
+        <p:nvSpPr>
+          <p:cNvPr id="2" name="Titel 1">
+            <a:extLst>
+              <a:ext uri="{FF2B5EF4-FFF2-40B4-BE49-F238E27FC236}">
+                <a16:creationId xmlns:a16="http://schemas.microsoft.com/office/drawing/2014/main" id="{60FB2F06-EF8A-4105-BFA3-024BDB9D9BBD}"/>
+              </a:ext>
+            </a:extLst>
+          </p:cNvPr>
+          <p:cNvSpPr>
+            <a:spLocks noGrp="1"/>
+          </p:cNvSpPr>
+          <p:nvPr>
+            <p:ph type="title"/>
+          </p:nvPr>
+        </p:nvSpPr>
+        <p:spPr/>
+        <p:txBody>
+          <a:bodyPr/>
+          <a:lstStyle/>
+          <a:p>
+            <a:r>
+              <a:rPr lang="de-DE" dirty="0"/>
+              <a:t>Load Balancer</a:t>
+            </a:r>
+          </a:p>
+        </p:txBody>
+      </p:sp>
+      <p:sp>
+        <p:nvSpPr>
+          <p:cNvPr id="3" name="Inhaltsplatzhalter 2">
+            <a:extLst>
+              <a:ext uri="{FF2B5EF4-FFF2-40B4-BE49-F238E27FC236}">
+                <a16:creationId xmlns:a16="http://schemas.microsoft.com/office/drawing/2014/main" id="{748AB6D0-79DE-4B5E-8EF7-0333D4C8C65B}"/>
+              </a:ext>
+            </a:extLst>
+          </p:cNvPr>
+          <p:cNvSpPr>
+            <a:spLocks noGrp="1"/>
+          </p:cNvSpPr>
+          <p:nvPr>
+            <p:ph idx="1"/>
+          </p:nvPr>
+        </p:nvSpPr>
+        <p:spPr/>
+        <p:txBody>
+          <a:bodyPr/>
+          <a:lstStyle/>
+          <a:p>
+            <a:r>
+              <a:rPr lang="de-DE" dirty="0"/>
+              <a:t>Setzt Lastverteilung in einem Netzwerk um</a:t>
+            </a:r>
+          </a:p>
+          <a:p>
+            <a:r>
+              <a:rPr lang="de-DE" dirty="0"/>
+              <a:t>Ermittelt welche Rechenressource die Clientanforderung erfüllen kann</a:t>
+            </a:r>
+          </a:p>
+          <a:p>
+            <a:r>
+              <a:rPr lang="de-DE" dirty="0"/>
+              <a:t>Realisiert als Software- oder Hardware-Load Balancer</a:t>
+            </a:r>
+          </a:p>
+          <a:p>
+            <a:r>
+              <a:rPr lang="de-DE" dirty="0"/>
+              <a:t>Nutzt Algorithmen wie zum Beispiel: Round Robin</a:t>
+            </a:r>
+          </a:p>
+          <a:p>
+            <a:endParaRPr lang="de-DE" dirty="0"/>
+          </a:p>
+        </p:txBody>
+      </p:sp>
+      <p:sp>
+        <p:nvSpPr>
+          <p:cNvPr id="4" name="Datumsplatzhalter 3">
+            <a:extLst>
+              <a:ext uri="{FF2B5EF4-FFF2-40B4-BE49-F238E27FC236}">
+                <a16:creationId xmlns:a16="http://schemas.microsoft.com/office/drawing/2014/main" id="{FC3E1DB0-BC43-4A50-BC2B-4DEAD31BF47F}"/>
+              </a:ext>
+            </a:extLst>
+          </p:cNvPr>
+          <p:cNvSpPr>
+            <a:spLocks noGrp="1"/>
+          </p:cNvSpPr>
+          <p:nvPr>
+            <p:ph type="dt" sz="half" idx="10"/>
+          </p:nvPr>
+        </p:nvSpPr>
+        <p:spPr/>
+        <p:txBody>
+          <a:bodyPr/>
+          <a:lstStyle/>
+          <a:p>
+            <a:fld id="{BB7604C3-A478-448A-88D6-07EFA8665C1F}" type="datetime1">
+              <a:rPr lang="de-DE" smtClean="0"/>
+              <a:t>04.11.2021</a:t>
+            </a:fld>
+            <a:endParaRPr lang="en-US"/>
+          </a:p>
+        </p:txBody>
+      </p:sp>
+      <p:sp>
+        <p:nvSpPr>
+          <p:cNvPr id="5" name="Fußzeilenplatzhalter 4">
+            <a:extLst>
+              <a:ext uri="{FF2B5EF4-FFF2-40B4-BE49-F238E27FC236}">
+                <a16:creationId xmlns:a16="http://schemas.microsoft.com/office/drawing/2014/main" id="{A2165779-FC43-4D82-9713-0A4ED67D61F0}"/>
+              </a:ext>
+            </a:extLst>
+          </p:cNvPr>
+          <p:cNvSpPr>
+            <a:spLocks noGrp="1"/>
+          </p:cNvSpPr>
+          <p:nvPr>
+            <p:ph type="ftr" sz="quarter" idx="11"/>
+          </p:nvPr>
+        </p:nvSpPr>
+        <p:spPr/>
+        <p:txBody>
+          <a:bodyPr/>
+          <a:lstStyle/>
+          <a:p>
+            <a:pPr algn="ctr"/>
+            <a:r>
+              <a:rPr lang="en-US"/>
+              <a:t>Benjamin Swarovsky</a:t>
+            </a:r>
+            <a:endParaRPr lang="en-US" dirty="0"/>
+          </a:p>
+        </p:txBody>
+      </p:sp>
+      <p:sp>
+        <p:nvSpPr>
+          <p:cNvPr id="6" name="Foliennummernplatzhalter 5">
+            <a:extLst>
+              <a:ext uri="{FF2B5EF4-FFF2-40B4-BE49-F238E27FC236}">
+                <a16:creationId xmlns:a16="http://schemas.microsoft.com/office/drawing/2014/main" id="{1683AD29-EB1F-4515-B5C7-20E068ECDBD5}"/>
+              </a:ext>
+            </a:extLst>
+          </p:cNvPr>
+          <p:cNvSpPr>
+            <a:spLocks noGrp="1"/>
+          </p:cNvSpPr>
+          <p:nvPr>
+            <p:ph type="sldNum" sz="quarter" idx="12"/>
+          </p:nvPr>
+        </p:nvSpPr>
+        <p:spPr/>
+        <p:txBody>
+          <a:bodyPr/>
+          <a:lstStyle/>
+          <a:p>
+            <a:fld id="{6D22F896-40B5-4ADD-8801-0D06FADFA095}" type="slidenum">
+              <a:rPr lang="en-US" smtClean="0"/>
+              <a:t>11</a:t>
+            </a:fld>
+            <a:endParaRPr lang="en-US"/>
+          </a:p>
+        </p:txBody>
+      </p:sp>
+    </p:spTree>
+    <p:extLst>
+      <p:ext uri="{BB962C8B-B14F-4D97-AF65-F5344CB8AC3E}">
+        <p14:creationId xmlns:p14="http://schemas.microsoft.com/office/powerpoint/2010/main" val="2951404399"/>
+      </p:ext>
+    </p:extLst>
+  </p:cSld>
+  <p:clrMapOvr>
+    <a:masterClrMapping/>
+  </p:clrMapOvr>
+</p:sld>
+</file>
+
+<file path=ppt/slides/slide12.xml><?xml version="1.0" encoding="utf-8"?>
+<p:sld xmlns:a="http://schemas.openxmlformats.org/drawingml/2006/main" xmlns:r="http://schemas.openxmlformats.org/officeDocument/2006/relationships" xmlns:p="http://schemas.openxmlformats.org/presentationml/2006/main">
+  <p:cSld>
+    <p:spTree>
+      <p:nvGrpSpPr>
+        <p:cNvPr id="1" name=""/>
+        <p:cNvGrpSpPr/>
+        <p:nvPr/>
+      </p:nvGrpSpPr>
+      <p:grpSpPr>
+        <a:xfrm>
+          <a:off x="0" y="0"/>
+          <a:ext cx="0" cy="0"/>
+          <a:chOff x="0" y="0"/>
+          <a:chExt cx="0" cy="0"/>
+        </a:xfrm>
+      </p:grpSpPr>
+      <p:sp>
+        <p:nvSpPr>
+          <p:cNvPr id="2" name="Titel 1">
+            <a:extLst>
+              <a:ext uri="{FF2B5EF4-FFF2-40B4-BE49-F238E27FC236}">
+                <a16:creationId xmlns:a16="http://schemas.microsoft.com/office/drawing/2014/main" id="{C98F4DDA-EB53-4CF7-9E8B-BD59A1432A4F}"/>
+              </a:ext>
+            </a:extLst>
+          </p:cNvPr>
+          <p:cNvSpPr>
+            <a:spLocks noGrp="1"/>
+          </p:cNvSpPr>
+          <p:nvPr>
+            <p:ph type="title"/>
+          </p:nvPr>
+        </p:nvSpPr>
+        <p:spPr/>
+        <p:txBody>
+          <a:bodyPr/>
+          <a:lstStyle/>
+          <a:p>
+            <a:r>
+              <a:rPr lang="de-DE" dirty="0"/>
+              <a:t>Spring Cloud API Gateway</a:t>
+            </a:r>
+          </a:p>
+        </p:txBody>
+      </p:sp>
+      <p:sp>
+        <p:nvSpPr>
+          <p:cNvPr id="3" name="Inhaltsplatzhalter 2">
+            <a:extLst>
+              <a:ext uri="{FF2B5EF4-FFF2-40B4-BE49-F238E27FC236}">
+                <a16:creationId xmlns:a16="http://schemas.microsoft.com/office/drawing/2014/main" id="{285FD663-7D7F-4F17-ABC8-BF9BF3EE491D}"/>
+              </a:ext>
+            </a:extLst>
+          </p:cNvPr>
+          <p:cNvSpPr>
+            <a:spLocks noGrp="1"/>
+          </p:cNvSpPr>
+          <p:nvPr>
+            <p:ph idx="1"/>
+          </p:nvPr>
+        </p:nvSpPr>
+        <p:spPr/>
+        <p:txBody>
+          <a:bodyPr>
+            <a:normAutofit lnSpcReduction="10000"/>
+          </a:bodyPr>
+          <a:lstStyle/>
+          <a:p>
+            <a:r>
+              <a:rPr lang="de-DE" dirty="0"/>
+              <a:t>Basiert auf asynchronen eventgetriebenen Framework </a:t>
+            </a:r>
+            <a:r>
+              <a:rPr lang="de-DE" dirty="0" err="1"/>
+              <a:t>Netty</a:t>
+            </a:r>
+            <a:r>
+              <a:rPr lang="de-DE" dirty="0"/>
+              <a:t> </a:t>
+            </a:r>
+          </a:p>
+          <a:p>
+            <a:r>
+              <a:rPr lang="de-DE" dirty="0"/>
+              <a:t>Features:</a:t>
+            </a:r>
+          </a:p>
+          <a:p>
+            <a:pPr lvl="1"/>
+            <a:r>
+              <a:rPr lang="de-DE" dirty="0"/>
+              <a:t>Ribbon Load Balancer</a:t>
+            </a:r>
+          </a:p>
+          <a:p>
+            <a:pPr lvl="1"/>
+            <a:r>
+              <a:rPr lang="de-DE" dirty="0"/>
+              <a:t>Sicherheitskonfigurationsmöglichkeiten mit Spring Security</a:t>
+            </a:r>
+          </a:p>
+          <a:p>
+            <a:pPr lvl="1"/>
+            <a:r>
+              <a:rPr lang="de-DE" dirty="0"/>
+              <a:t>Einbindung eigener Filter</a:t>
+            </a:r>
+          </a:p>
+          <a:p>
+            <a:r>
+              <a:rPr lang="de-DE" dirty="0"/>
+              <a:t>Einfache Integration in Spring Anwendung </a:t>
+            </a:r>
+          </a:p>
+          <a:p>
+            <a:endParaRPr lang="de-DE" dirty="0"/>
+          </a:p>
+          <a:p>
+            <a:r>
+              <a:rPr lang="de-DE" dirty="0"/>
+              <a:t>Alternativen: </a:t>
+            </a:r>
+            <a:r>
+              <a:rPr lang="de-DE" dirty="0" err="1"/>
+              <a:t>Ocelot</a:t>
+            </a:r>
+            <a:r>
+              <a:rPr lang="de-DE" dirty="0"/>
+              <a:t>, </a:t>
+            </a:r>
+            <a:r>
+              <a:rPr lang="de-DE" dirty="0" err="1"/>
+              <a:t>KrakenD</a:t>
+            </a:r>
+            <a:r>
+              <a:rPr lang="de-DE" dirty="0"/>
+              <a:t>, Kong</a:t>
+            </a:r>
+          </a:p>
+          <a:p>
+            <a:endParaRPr lang="de-DE" dirty="0"/>
+          </a:p>
+        </p:txBody>
+      </p:sp>
+      <p:sp>
+        <p:nvSpPr>
+          <p:cNvPr id="4" name="Datumsplatzhalter 3">
+            <a:extLst>
+              <a:ext uri="{FF2B5EF4-FFF2-40B4-BE49-F238E27FC236}">
+                <a16:creationId xmlns:a16="http://schemas.microsoft.com/office/drawing/2014/main" id="{422593B4-547E-410E-8222-6C451C90D117}"/>
+              </a:ext>
+            </a:extLst>
+          </p:cNvPr>
+          <p:cNvSpPr>
+            <a:spLocks noGrp="1"/>
+          </p:cNvSpPr>
+          <p:nvPr>
+            <p:ph type="dt" sz="half" idx="10"/>
+          </p:nvPr>
+        </p:nvSpPr>
+        <p:spPr/>
+        <p:txBody>
+          <a:bodyPr/>
+          <a:lstStyle/>
+          <a:p>
+            <a:fld id="{BB7604C3-A478-448A-88D6-07EFA8665C1F}" type="datetime1">
+              <a:rPr lang="de-DE" smtClean="0"/>
+              <a:t>04.11.2021</a:t>
+            </a:fld>
+            <a:endParaRPr lang="en-US"/>
+          </a:p>
+        </p:txBody>
+      </p:sp>
+      <p:sp>
+        <p:nvSpPr>
+          <p:cNvPr id="5" name="Fußzeilenplatzhalter 4">
+            <a:extLst>
+              <a:ext uri="{FF2B5EF4-FFF2-40B4-BE49-F238E27FC236}">
+                <a16:creationId xmlns:a16="http://schemas.microsoft.com/office/drawing/2014/main" id="{91C237D6-6EFF-4509-A526-AE54F56AABB5}"/>
+              </a:ext>
+            </a:extLst>
+          </p:cNvPr>
+          <p:cNvSpPr>
+            <a:spLocks noGrp="1"/>
+          </p:cNvSpPr>
+          <p:nvPr>
+            <p:ph type="ftr" sz="quarter" idx="11"/>
+          </p:nvPr>
+        </p:nvSpPr>
+        <p:spPr/>
+        <p:txBody>
+          <a:bodyPr/>
+          <a:lstStyle/>
+          <a:p>
+            <a:pPr algn="ctr"/>
+            <a:r>
+              <a:rPr lang="en-US"/>
+              <a:t>Benjamin Swarovsky</a:t>
+            </a:r>
+            <a:endParaRPr lang="en-US" dirty="0"/>
+          </a:p>
+        </p:txBody>
+      </p:sp>
+      <p:sp>
+        <p:nvSpPr>
+          <p:cNvPr id="6" name="Foliennummernplatzhalter 5">
+            <a:extLst>
+              <a:ext uri="{FF2B5EF4-FFF2-40B4-BE49-F238E27FC236}">
+                <a16:creationId xmlns:a16="http://schemas.microsoft.com/office/drawing/2014/main" id="{D07A4059-489E-4C33-836E-C480D4D85231}"/>
+              </a:ext>
+            </a:extLst>
+          </p:cNvPr>
+          <p:cNvSpPr>
+            <a:spLocks noGrp="1"/>
+          </p:cNvSpPr>
+          <p:nvPr>
+            <p:ph type="sldNum" sz="quarter" idx="12"/>
+          </p:nvPr>
+        </p:nvSpPr>
+        <p:spPr/>
+        <p:txBody>
+          <a:bodyPr/>
+          <a:lstStyle/>
+          <a:p>
+            <a:fld id="{6D22F896-40B5-4ADD-8801-0D06FADFA095}" type="slidenum">
+              <a:rPr lang="en-US" smtClean="0"/>
+              <a:t>12</a:t>
+            </a:fld>
+            <a:endParaRPr lang="en-US"/>
+          </a:p>
+        </p:txBody>
+      </p:sp>
+    </p:spTree>
+    <p:extLst>
+      <p:ext uri="{BB962C8B-B14F-4D97-AF65-F5344CB8AC3E}">
+        <p14:creationId xmlns:p14="http://schemas.microsoft.com/office/powerpoint/2010/main" val="630963580"/>
+      </p:ext>
+    </p:extLst>
+  </p:cSld>
+  <p:clrMapOvr>
+    <a:masterClrMapping/>
+  </p:clrMapOvr>
+</p:sld>
+</file>
+
+<file path=ppt/slides/slide13.xml><?xml version="1.0" encoding="utf-8"?>
+<p:sld xmlns:a="http://schemas.openxmlformats.org/drawingml/2006/main" xmlns:r="http://schemas.openxmlformats.org/officeDocument/2006/relationships" xmlns:p="http://schemas.openxmlformats.org/presentationml/2006/main">
+  <p:cSld>
+    <p:spTree>
+      <p:nvGrpSpPr>
+        <p:cNvPr id="1" name=""/>
+        <p:cNvGrpSpPr/>
+        <p:nvPr/>
+      </p:nvGrpSpPr>
+      <p:grpSpPr>
+        <a:xfrm>
+          <a:off x="0" y="0"/>
+          <a:ext cx="0" cy="0"/>
+          <a:chOff x="0" y="0"/>
+          <a:chExt cx="0" cy="0"/>
+        </a:xfrm>
+      </p:grpSpPr>
+      <p:sp>
+        <p:nvSpPr>
+          <p:cNvPr id="2" name="Titel 1">
+            <a:extLst>
+              <a:ext uri="{FF2B5EF4-FFF2-40B4-BE49-F238E27FC236}">
+                <a16:creationId xmlns:a16="http://schemas.microsoft.com/office/drawing/2014/main" id="{A393D4A7-87E0-4E1B-9350-328351FD77BD}"/>
+              </a:ext>
+            </a:extLst>
+          </p:cNvPr>
+          <p:cNvSpPr>
+            <a:spLocks noGrp="1"/>
+          </p:cNvSpPr>
+          <p:nvPr>
+            <p:ph type="title"/>
+          </p:nvPr>
+        </p:nvSpPr>
+        <p:spPr/>
+        <p:txBody>
+          <a:bodyPr/>
+          <a:lstStyle/>
+          <a:p>
+            <a:r>
+              <a:rPr lang="de-DE" dirty="0"/>
+              <a:t>API Gateway - Implementierung</a:t>
+            </a:r>
+          </a:p>
+        </p:txBody>
+      </p:sp>
+      <p:sp>
+        <p:nvSpPr>
+          <p:cNvPr id="4" name="Datumsplatzhalter 3">
+            <a:extLst>
+              <a:ext uri="{FF2B5EF4-FFF2-40B4-BE49-F238E27FC236}">
+                <a16:creationId xmlns:a16="http://schemas.microsoft.com/office/drawing/2014/main" id="{CC976508-65A9-4915-B2AB-08E1244E7F65}"/>
+              </a:ext>
+            </a:extLst>
+          </p:cNvPr>
+          <p:cNvSpPr>
+            <a:spLocks noGrp="1"/>
+          </p:cNvSpPr>
+          <p:nvPr>
+            <p:ph type="dt" sz="half" idx="10"/>
+          </p:nvPr>
+        </p:nvSpPr>
+        <p:spPr/>
+        <p:txBody>
+          <a:bodyPr/>
+          <a:lstStyle/>
+          <a:p>
+            <a:fld id="{BB7604C3-A478-448A-88D6-07EFA8665C1F}" type="datetime1">
+              <a:rPr lang="de-DE" smtClean="0"/>
+              <a:t>04.11.2021</a:t>
+            </a:fld>
+            <a:endParaRPr lang="en-US"/>
+          </a:p>
+        </p:txBody>
+      </p:sp>
+      <p:sp>
+        <p:nvSpPr>
+          <p:cNvPr id="5" name="Fußzeilenplatzhalter 4">
+            <a:extLst>
+              <a:ext uri="{FF2B5EF4-FFF2-40B4-BE49-F238E27FC236}">
+                <a16:creationId xmlns:a16="http://schemas.microsoft.com/office/drawing/2014/main" id="{63510A91-F841-4F82-88BC-7B504F118D39}"/>
+              </a:ext>
+            </a:extLst>
+          </p:cNvPr>
+          <p:cNvSpPr>
+            <a:spLocks noGrp="1"/>
+          </p:cNvSpPr>
+          <p:nvPr>
+            <p:ph type="ftr" sz="quarter" idx="11"/>
+          </p:nvPr>
+        </p:nvSpPr>
+        <p:spPr/>
+        <p:txBody>
+          <a:bodyPr/>
+          <a:lstStyle/>
+          <a:p>
+            <a:pPr algn="ctr"/>
+            <a:r>
+              <a:rPr lang="en-US"/>
+              <a:t>Benjamin Swarovsky</a:t>
+            </a:r>
+            <a:endParaRPr lang="en-US" dirty="0"/>
+          </a:p>
+        </p:txBody>
+      </p:sp>
+      <p:sp>
+        <p:nvSpPr>
+          <p:cNvPr id="6" name="Foliennummernplatzhalter 5">
+            <a:extLst>
+              <a:ext uri="{FF2B5EF4-FFF2-40B4-BE49-F238E27FC236}">
+                <a16:creationId xmlns:a16="http://schemas.microsoft.com/office/drawing/2014/main" id="{D07C6A35-E2E0-42F0-B2A8-FDA7A0413F79}"/>
+              </a:ext>
+            </a:extLst>
+          </p:cNvPr>
+          <p:cNvSpPr>
+            <a:spLocks noGrp="1"/>
+          </p:cNvSpPr>
+          <p:nvPr>
+            <p:ph type="sldNum" sz="quarter" idx="12"/>
+          </p:nvPr>
+        </p:nvSpPr>
+        <p:spPr/>
+        <p:txBody>
+          <a:bodyPr/>
+          <a:lstStyle/>
+          <a:p>
+            <a:fld id="{6D22F896-40B5-4ADD-8801-0D06FADFA095}" type="slidenum">
+              <a:rPr lang="en-US" smtClean="0"/>
+              <a:t>13</a:t>
+            </a:fld>
+            <a:endParaRPr lang="en-US"/>
+          </a:p>
+        </p:txBody>
+      </p:sp>
+      <p:pic>
+        <p:nvPicPr>
+          <p:cNvPr id="18" name="Inhaltsplatzhalter 17" descr="Ein Bild, das Text enthält.&#10;&#10;Automatisch generierte Beschreibung">
+            <a:extLst>
+              <a:ext uri="{FF2B5EF4-FFF2-40B4-BE49-F238E27FC236}">
+                <a16:creationId xmlns:a16="http://schemas.microsoft.com/office/drawing/2014/main" id="{065C3447-6258-4897-B627-02F458FFDF33}"/>
+              </a:ext>
+            </a:extLst>
+          </p:cNvPr>
+          <p:cNvPicPr>
+            <a:picLocks noGrp="1" noChangeAspect="1"/>
+          </p:cNvPicPr>
+          <p:nvPr>
+            <p:ph idx="1"/>
+          </p:nvPr>
+        </p:nvPicPr>
+        <p:blipFill>
+          <a:blip r:embed="rId2"/>
+          <a:stretch>
+            <a:fillRect/>
+          </a:stretch>
+        </p:blipFill>
+        <p:spPr>
+          <a:xfrm>
+            <a:off x="1553802" y="1994677"/>
+            <a:ext cx="7125694" cy="724001"/>
+          </a:xfrm>
+        </p:spPr>
+      </p:pic>
+      <p:pic>
+        <p:nvPicPr>
+          <p:cNvPr id="20" name="Grafik 19">
+            <a:extLst>
+              <a:ext uri="{FF2B5EF4-FFF2-40B4-BE49-F238E27FC236}">
+                <a16:creationId xmlns:a16="http://schemas.microsoft.com/office/drawing/2014/main" id="{2B4106DB-FE6B-4574-9D84-532BF6F088B5}"/>
+              </a:ext>
+            </a:extLst>
+          </p:cNvPr>
+          <p:cNvPicPr>
+            <a:picLocks noChangeAspect="1"/>
+          </p:cNvPicPr>
+          <p:nvPr/>
+        </p:nvPicPr>
+        <p:blipFill>
+          <a:blip r:embed="rId3"/>
+          <a:stretch>
+            <a:fillRect/>
+          </a:stretch>
+        </p:blipFill>
+        <p:spPr>
+          <a:xfrm>
+            <a:off x="1553802" y="3553481"/>
+            <a:ext cx="7156168" cy="2134463"/>
+          </a:xfrm>
+          <a:prstGeom prst="rect">
+            <a:avLst/>
+          </a:prstGeom>
+        </p:spPr>
+      </p:pic>
+    </p:spTree>
+    <p:extLst>
+      <p:ext uri="{BB962C8B-B14F-4D97-AF65-F5344CB8AC3E}">
+        <p14:creationId xmlns:p14="http://schemas.microsoft.com/office/powerpoint/2010/main" val="3233717774"/>
       </p:ext>
     </p:extLst>
   </p:cSld>
@@ -7467,7 +8853,7 @@
                   </a:schemeClr>
                 </a:solidFill>
               </a:rPr>
-              <a:t>Loadbalancer</a:t>
+              <a:t>Load Balancer</a:t>
             </a:r>
           </a:p>
           <a:p>
@@ -8445,7 +9831,7 @@
                   </a:schemeClr>
                 </a:solidFill>
               </a:rPr>
-              <a:t>Loadbalancer</a:t>
+              <a:t>Load Balancer</a:t>
             </a:r>
           </a:p>
           <a:p>
@@ -9499,6 +10885,13 @@
           <a:p>
             <a:r>
               <a:rPr lang="de-DE" sz="4000" b="1" dirty="0"/>
+              <a:t>API Gateway / Load Balancer</a:t>
+            </a:r>
+          </a:p>
+          <a:p>
+            <a:pPr lvl="1"/>
+            <a:r>
+              <a:rPr lang="de-DE" sz="3800" b="1" dirty="0"/>
               <a:t>API Gateway</a:t>
             </a:r>
           </a:p>
@@ -9506,7 +10899,7 @@
             <a:pPr lvl="1"/>
             <a:r>
               <a:rPr lang="de-DE" sz="3800" b="1" dirty="0"/>
-              <a:t>Grundlagen</a:t>
+              <a:t>Load Balancer </a:t>
             </a:r>
           </a:p>
           <a:p>
@@ -9533,18 +10926,6 @@
                 </a:solidFill>
               </a:rPr>
               <a:t>Service Discovery</a:t>
-            </a:r>
-          </a:p>
-          <a:p>
-            <a:r>
-              <a:rPr lang="de-DE" sz="4000" dirty="0">
-                <a:solidFill>
-                  <a:schemeClr val="tx1">
-                    <a:lumMod val="75000"/>
-                  </a:schemeClr>
-                </a:solidFill>
-              </a:rPr>
-              <a:t>Loadbalancer</a:t>
             </a:r>
           </a:p>
           <a:p>
@@ -10225,12 +11606,6 @@
 </file>
 
 <file path=customXml/item2.xml><?xml version="1.0" encoding="utf-8"?>
-<p:properties xmlns:p="http://schemas.microsoft.com/office/2006/metadata/properties" xmlns:xsi="http://www.w3.org/2001/XMLSchema-instance" xmlns:pc="http://schemas.microsoft.com/office/infopath/2007/PartnerControls">
-  <documentManagement/>
-</p:properties>
-</file>
-
-<file path=customXml/item3.xml><?xml version="1.0" encoding="utf-8"?>
 <ct:contentTypeSchema xmlns:ct="http://schemas.microsoft.com/office/2006/metadata/contentType" xmlns:ma="http://schemas.microsoft.com/office/2006/metadata/properties/metaAttributes" ct:_="" ma:_="" ma:contentTypeName="Dokument" ma:contentTypeID="0x01010057DEBC6757D75944BF029D53C906043C" ma:contentTypeVersion="2" ma:contentTypeDescription="Ein neues Dokument erstellen." ma:contentTypeScope="" ma:versionID="92b2e5e144b5888bfe8e1716395d2054">
   <xsd:schema xmlns:xsd="http://www.w3.org/2001/XMLSchema" xmlns:xs="http://www.w3.org/2001/XMLSchema" xmlns:p="http://schemas.microsoft.com/office/2006/metadata/properties" xmlns:ns3="2e5082aa-21a9-4fb8-bc02-de89f01dc016" targetNamespace="http://schemas.microsoft.com/office/2006/metadata/properties" ma:root="true" ma:fieldsID="750a51e2518c422fe3db59dbb0fb1318" ns3:_="">
     <xsd:import namespace="2e5082aa-21a9-4fb8-bc02-de89f01dc016"/>
@@ -10362,6 +11737,12 @@
 </ct:contentTypeSchema>
 </file>
 
+<file path=customXml/item3.xml><?xml version="1.0" encoding="utf-8"?>
+<p:properties xmlns:p="http://schemas.microsoft.com/office/2006/metadata/properties" xmlns:xsi="http://www.w3.org/2001/XMLSchema-instance" xmlns:pc="http://schemas.microsoft.com/office/infopath/2007/PartnerControls">
+  <documentManagement/>
+</p:properties>
+</file>
+
 <file path=customXml/itemProps1.xml><?xml version="1.0" encoding="utf-8"?>
 <ds:datastoreItem xmlns:ds="http://schemas.openxmlformats.org/officeDocument/2006/customXml" ds:itemID="{2ABFB1C4-DEB4-4487-BA3A-A97A672A3FD3}">
   <ds:schemaRefs>
@@ -10371,22 +11752,6 @@
 </file>
 
 <file path=customXml/itemProps2.xml><?xml version="1.0" encoding="utf-8"?>
-<ds:datastoreItem xmlns:ds="http://schemas.openxmlformats.org/officeDocument/2006/customXml" ds:itemID="{FA6182B4-BB90-4186-BC76-0BE8F85920D5}">
-  <ds:schemaRefs>
-    <ds:schemaRef ds:uri="2e5082aa-21a9-4fb8-bc02-de89f01dc016"/>
-    <ds:schemaRef ds:uri="http://purl.org/dc/dcmitype/"/>
-    <ds:schemaRef ds:uri="http://purl.org/dc/elements/1.1/"/>
-    <ds:schemaRef ds:uri="http://purl.org/dc/terms/"/>
-    <ds:schemaRef ds:uri="http://schemas.microsoft.com/office/2006/documentManagement/types"/>
-    <ds:schemaRef ds:uri="http://schemas.microsoft.com/office/2006/metadata/properties"/>
-    <ds:schemaRef ds:uri="http://schemas.microsoft.com/office/infopath/2007/PartnerControls"/>
-    <ds:schemaRef ds:uri="http://schemas.openxmlformats.org/package/2006/metadata/core-properties"/>
-    <ds:schemaRef ds:uri="http://www.w3.org/XML/1998/namespace"/>
-  </ds:schemaRefs>
-</ds:datastoreItem>
-</file>
-
-<file path=customXml/itemProps3.xml><?xml version="1.0" encoding="utf-8"?>
 <ds:datastoreItem xmlns:ds="http://schemas.openxmlformats.org/officeDocument/2006/customXml" ds:itemID="{3E893F45-019B-40EF-B832-242EE941AB77}">
   <ds:schemaRefs>
     <ds:schemaRef ds:uri="2e5082aa-21a9-4fb8-bc02-de89f01dc016"/>
@@ -10402,4 +11767,20 @@
     <ds:schemaRef ds:uri="http://www.w3.org/2001/XMLSchema"/>
   </ds:schemaRefs>
 </ds:datastoreItem>
+</file>
+
+<file path=customXml/itemProps3.xml><?xml version="1.0" encoding="utf-8"?>
+<ds:datastoreItem xmlns:ds="http://schemas.openxmlformats.org/officeDocument/2006/customXml" ds:itemID="{FA6182B4-BB90-4186-BC76-0BE8F85920D5}">
+  <ds:schemaRefs>
+    <ds:schemaRef ds:uri="2e5082aa-21a9-4fb8-bc02-de89f01dc016"/>
+    <ds:schemaRef ds:uri="http://purl.org/dc/dcmitype/"/>
+    <ds:schemaRef ds:uri="http://purl.org/dc/elements/1.1/"/>
+    <ds:schemaRef ds:uri="http://purl.org/dc/terms/"/>
+    <ds:schemaRef ds:uri="http://schemas.microsoft.com/office/2006/documentManagement/types"/>
+    <ds:schemaRef ds:uri="http://schemas.microsoft.com/office/2006/metadata/properties"/>
+    <ds:schemaRef ds:uri="http://schemas.microsoft.com/office/infopath/2007/PartnerControls"/>
+    <ds:schemaRef ds:uri="http://schemas.openxmlformats.org/package/2006/metadata/core-properties"/>
+    <ds:schemaRef ds:uri="http://www.w3.org/XML/1998/namespace"/>
+  </ds:schemaRefs>
+</ds:datastoreItem>
 </file>
</xml_diff>